<commit_message>
Fix: placeholder detectie & nieuwe SjabloonRustig upload
</commit_message>
<xml_diff>
--- a/sjablonen/SjabloonRustig.pptx
+++ b/sjablonen/SjabloonRustig.pptx
@@ -1052,7 +1052,7 @@
           <a:bodyPr/>
           <a:lstStyle/>
           <a:p>
-            <a:endParaRPr lang="nl-NL"/>
+            <a:endParaRPr lang="nl-NL" dirty="0"/>
           </a:p>
         </p:txBody>
       </p:sp>
@@ -1114,7 +1114,7 @@
             </a:extLst>
           </p:cNvPr>
           <p:cNvSpPr>
-            <a:spLocks/>
+            <a:spLocks noGrp="1"/>
           </p:cNvSpPr>
           <p:nvPr>
             <p:ph type="pic" sz="quarter" idx="11"/>
@@ -1132,7 +1132,7 @@
             </a:extLst>
           </p:cNvPr>
           <p:cNvSpPr>
-            <a:spLocks/>
+            <a:spLocks noGrp="1"/>
           </p:cNvSpPr>
           <p:nvPr>
             <p:ph type="pic" sz="quarter" idx="10"/>

</xml_diff>